<commit_message>
im ok im ok deep breathing im ok im good im ok
</commit_message>
<xml_diff>
--- a/document/Mid_Presentation_templet.pptx
+++ b/document/Mid_Presentation_templet.pptx
@@ -37,35 +37,35 @@
   <p:notesSz cx="6858000" cy="9144000"/>
   <p:embeddedFontLst>
     <p:embeddedFont>
-      <p:font typeface="나눔고딕" pitchFamily="50" charset="-127"/>
+      <p:font typeface="Segoe UI" pitchFamily="34" charset="0"/>
       <p:regular r:id="rId25"/>
       <p:bold r:id="rId26"/>
+      <p:italic r:id="rId27"/>
+      <p:boldItalic r:id="rId28"/>
+    </p:embeddedFont>
+    <p:embeddedFont>
+      <p:font typeface="Calibri" pitchFamily="34" charset="0"/>
+      <p:regular r:id="rId29"/>
+      <p:bold r:id="rId30"/>
+      <p:italic r:id="rId31"/>
+      <p:boldItalic r:id="rId32"/>
+    </p:embeddedFont>
+    <p:embeddedFont>
+      <p:font typeface="나눔고딕" pitchFamily="50" charset="-127"/>
+      <p:regular r:id="rId33"/>
+      <p:bold r:id="rId34"/>
     </p:embeddedFont>
     <p:embeddedFont>
       <p:font typeface="Georgia" pitchFamily="18" charset="0"/>
-      <p:regular r:id="rId27"/>
-      <p:bold r:id="rId28"/>
-      <p:italic r:id="rId29"/>
-      <p:boldItalic r:id="rId30"/>
+      <p:regular r:id="rId35"/>
+      <p:bold r:id="rId36"/>
+      <p:italic r:id="rId37"/>
+      <p:boldItalic r:id="rId38"/>
     </p:embeddedFont>
     <p:embeddedFont>
       <p:font typeface="맑은 고딕" pitchFamily="50" charset="-127"/>
-      <p:regular r:id="rId31"/>
-      <p:bold r:id="rId32"/>
-    </p:embeddedFont>
-    <p:embeddedFont>
-      <p:font typeface="Segoe UI" pitchFamily="34" charset="0"/>
-      <p:regular r:id="rId33"/>
-      <p:bold r:id="rId34"/>
-      <p:italic r:id="rId35"/>
-      <p:boldItalic r:id="rId36"/>
-    </p:embeddedFont>
-    <p:embeddedFont>
-      <p:font typeface="Calibri" pitchFamily="34" charset="0"/>
-      <p:regular r:id="rId37"/>
-      <p:bold r:id="rId38"/>
-      <p:italic r:id="rId39"/>
-      <p:boldItalic r:id="rId40"/>
+      <p:regular r:id="rId39"/>
+      <p:bold r:id="rId40"/>
     </p:embeddedFont>
     <p:embeddedFont>
       <p:font typeface="HY목각파임B" pitchFamily="18" charset="-127"/>
@@ -13040,12 +13040,20 @@
       </p:grpSp>
       <p:pic>
         <p:nvPicPr>
-          <p:cNvPr id="31" name="그림 30"/>
-          <p:cNvPicPr/>
+          <p:cNvPr id="1027" name="Picture 3"/>
+          <p:cNvPicPr>
+            <a:picLocks noChangeAspect="1" noChangeArrowheads="1"/>
+          </p:cNvPicPr>
           <p:nvPr/>
         </p:nvPicPr>
         <p:blipFill>
-          <a:blip r:embed="rId3" cstate="print"/>
+          <a:blip r:embed="rId3">
+            <a:extLst>
+              <a:ext uri="{28A0092B-C50C-407E-A947-70E740481C1C}">
+                <a14:useLocalDpi xmlns:a14="http://schemas.microsoft.com/office/drawing/2010/main" val="0"/>
+              </a:ext>
+            </a:extLst>
+          </a:blip>
           <a:srcRect/>
           <a:stretch>
             <a:fillRect/>
@@ -13053,19 +13061,45 @@
         </p:blipFill>
         <p:spPr bwMode="auto">
           <a:xfrm>
-            <a:off x="598529" y="1412776"/>
-            <a:ext cx="7946941" cy="4608512"/>
+            <a:off x="239588" y="1145629"/>
+            <a:ext cx="8724900" cy="5019675"/>
           </a:xfrm>
           <a:prstGeom prst="rect">
             <a:avLst/>
           </a:prstGeom>
           <a:noFill/>
-          <a:ln w="9525">
+          <a:ln>
             <a:noFill/>
-            <a:miter lim="800000"/>
-            <a:headEnd/>
-            <a:tailEnd/>
           </a:ln>
+          <a:effectLst/>
+          <a:extLst>
+            <a:ext uri="{909E8E84-426E-40DD-AFC4-6F175D3DCCD1}">
+              <a14:hiddenFill xmlns:a14="http://schemas.microsoft.com/office/drawing/2010/main">
+                <a:solidFill>
+                  <a:schemeClr val="accent1"/>
+                </a:solidFill>
+              </a14:hiddenFill>
+            </a:ext>
+            <a:ext uri="{91240B29-F687-4F45-9708-019B960494DF}">
+              <a14:hiddenLine xmlns:a14="http://schemas.microsoft.com/office/drawing/2010/main" w="9525">
+                <a:solidFill>
+                  <a:schemeClr val="tx1"/>
+                </a:solidFill>
+                <a:miter lim="800000"/>
+                <a:headEnd/>
+                <a:tailEnd/>
+              </a14:hiddenLine>
+            </a:ext>
+            <a:ext uri="{AF507438-7753-43E0-B8FC-AC1667EBCBE1}">
+              <a14:hiddenEffects xmlns:a14="http://schemas.microsoft.com/office/drawing/2010/main">
+                <a:effectLst>
+                  <a:outerShdw dist="35921" dir="2700000" algn="ctr" rotWithShape="0">
+                    <a:schemeClr val="bg2"/>
+                  </a:outerShdw>
+                </a:effectLst>
+              </a14:hiddenEffects>
+            </a:ext>
+          </a:extLst>
         </p:spPr>
       </p:pic>
     </p:spTree>

</xml_diff>